<commit_message>
Add week 8 files and update Joy of Painting files
</commit_message>
<xml_diff>
--- a/Ross Joy of Painting/hw04_Over_Lisa_ross_db_model.pptx
+++ b/Ross Joy of Painting/hw04_Over_Lisa_ross_db_model.pptx
@@ -203,7 +203,7 @@
           <a:p>
             <a:fld id="{6831E22B-9873-A448-AE08-4DDD3B823C68}" type="datetimeFigureOut">
               <a:rPr lang="en-US" smtClean="0"/>
-              <a:t>3/8/21</a:t>
+              <a:t>3/9/21</a:t>
             </a:fld>
             <a:endParaRPr lang="en-US"/>
           </a:p>
@@ -470,6 +470,90 @@
 </p:notesMaster>
 </file>
 
+<file path=ppt/notesSlides/notesSlide1.xml><?xml version="1.0" encoding="utf-8"?>
+<p:notes xmlns:a="http://schemas.openxmlformats.org/drawingml/2006/main" xmlns:r="http://schemas.openxmlformats.org/officeDocument/2006/relationships" xmlns:p="http://schemas.openxmlformats.org/presentationml/2006/main">
+  <p:cSld>
+    <p:spTree>
+      <p:nvGrpSpPr>
+        <p:cNvPr id="1" name=""/>
+        <p:cNvGrpSpPr/>
+        <p:nvPr/>
+      </p:nvGrpSpPr>
+      <p:grpSpPr>
+        <a:xfrm>
+          <a:off x="0" y="0"/>
+          <a:ext cx="0" cy="0"/>
+          <a:chOff x="0" y="0"/>
+          <a:chExt cx="0" cy="0"/>
+        </a:xfrm>
+      </p:grpSpPr>
+      <p:sp>
+        <p:nvSpPr>
+          <p:cNvPr id="2" name="Slide Image Placeholder 1"/>
+          <p:cNvSpPr>
+            <a:spLocks noGrp="1" noRot="1" noChangeAspect="1"/>
+          </p:cNvSpPr>
+          <p:nvPr>
+            <p:ph type="sldImg"/>
+          </p:nvPr>
+        </p:nvSpPr>
+        <p:spPr/>
+      </p:sp>
+      <p:sp>
+        <p:nvSpPr>
+          <p:cNvPr id="3" name="Notes Placeholder 2"/>
+          <p:cNvSpPr>
+            <a:spLocks noGrp="1"/>
+          </p:cNvSpPr>
+          <p:nvPr>
+            <p:ph type="body" idx="1"/>
+          </p:nvPr>
+        </p:nvSpPr>
+        <p:spPr/>
+        <p:txBody>
+          <a:bodyPr/>
+          <a:lstStyle/>
+          <a:p>
+            <a:endParaRPr lang="en-US" dirty="0"/>
+          </a:p>
+        </p:txBody>
+      </p:sp>
+      <p:sp>
+        <p:nvSpPr>
+          <p:cNvPr id="4" name="Slide Number Placeholder 3"/>
+          <p:cNvSpPr>
+            <a:spLocks noGrp="1"/>
+          </p:cNvSpPr>
+          <p:nvPr>
+            <p:ph type="sldNum" sz="quarter" idx="5"/>
+          </p:nvPr>
+        </p:nvSpPr>
+        <p:spPr/>
+        <p:txBody>
+          <a:bodyPr/>
+          <a:lstStyle/>
+          <a:p>
+            <a:fld id="{2ECFDA64-B45D-634E-BA35-A1ABDC481A66}" type="slidenum">
+              <a:rPr lang="en-US" smtClean="0"/>
+              <a:t>7</a:t>
+            </a:fld>
+            <a:endParaRPr lang="en-US"/>
+          </a:p>
+        </p:txBody>
+      </p:sp>
+    </p:spTree>
+    <p:extLst>
+      <p:ext uri="{BB962C8B-B14F-4D97-AF65-F5344CB8AC3E}">
+        <p14:creationId xmlns:p14="http://schemas.microsoft.com/office/powerpoint/2010/main" val="552635387"/>
+      </p:ext>
+    </p:extLst>
+  </p:cSld>
+  <p:clrMapOvr>
+    <a:masterClrMapping/>
+  </p:clrMapOvr>
+</p:notes>
+</file>
+
 <file path=ppt/slideLayouts/slideLayout1.xml><?xml version="1.0" encoding="utf-8"?>
 <p:sldLayout xmlns:a="http://schemas.openxmlformats.org/drawingml/2006/main" xmlns:r="http://schemas.openxmlformats.org/officeDocument/2006/relationships" xmlns:p="http://schemas.openxmlformats.org/presentationml/2006/main" type="title" preserve="1">
   <p:cSld name="Title Slide">
@@ -617,7 +701,7 @@
           <a:p>
             <a:fld id="{B35E71E4-6124-034D-B2B1-03D434D48E1D}" type="datetimeFigureOut">
               <a:rPr lang="en-US" smtClean="0"/>
-              <a:t>3/8/21</a:t>
+              <a:t>3/9/21</a:t>
             </a:fld>
             <a:endParaRPr lang="en-US"/>
           </a:p>
@@ -815,7 +899,7 @@
           <a:p>
             <a:fld id="{B35E71E4-6124-034D-B2B1-03D434D48E1D}" type="datetimeFigureOut">
               <a:rPr lang="en-US" smtClean="0"/>
-              <a:t>3/8/21</a:t>
+              <a:t>3/9/21</a:t>
             </a:fld>
             <a:endParaRPr lang="en-US"/>
           </a:p>
@@ -1023,7 +1107,7 @@
           <a:p>
             <a:fld id="{B35E71E4-6124-034D-B2B1-03D434D48E1D}" type="datetimeFigureOut">
               <a:rPr lang="en-US" smtClean="0"/>
-              <a:t>3/8/21</a:t>
+              <a:t>3/9/21</a:t>
             </a:fld>
             <a:endParaRPr lang="en-US"/>
           </a:p>
@@ -1221,7 +1305,7 @@
           <a:p>
             <a:fld id="{B35E71E4-6124-034D-B2B1-03D434D48E1D}" type="datetimeFigureOut">
               <a:rPr lang="en-US" smtClean="0"/>
-              <a:t>3/8/21</a:t>
+              <a:t>3/9/21</a:t>
             </a:fld>
             <a:endParaRPr lang="en-US"/>
           </a:p>
@@ -1496,7 +1580,7 @@
           <a:p>
             <a:fld id="{B35E71E4-6124-034D-B2B1-03D434D48E1D}" type="datetimeFigureOut">
               <a:rPr lang="en-US" smtClean="0"/>
-              <a:t>3/8/21</a:t>
+              <a:t>3/9/21</a:t>
             </a:fld>
             <a:endParaRPr lang="en-US"/>
           </a:p>
@@ -1761,7 +1845,7 @@
           <a:p>
             <a:fld id="{B35E71E4-6124-034D-B2B1-03D434D48E1D}" type="datetimeFigureOut">
               <a:rPr lang="en-US" smtClean="0"/>
-              <a:t>3/8/21</a:t>
+              <a:t>3/9/21</a:t>
             </a:fld>
             <a:endParaRPr lang="en-US"/>
           </a:p>
@@ -2173,7 +2257,7 @@
           <a:p>
             <a:fld id="{B35E71E4-6124-034D-B2B1-03D434D48E1D}" type="datetimeFigureOut">
               <a:rPr lang="en-US" smtClean="0"/>
-              <a:t>3/8/21</a:t>
+              <a:t>3/9/21</a:t>
             </a:fld>
             <a:endParaRPr lang="en-US"/>
           </a:p>
@@ -2314,7 +2398,7 @@
           <a:p>
             <a:fld id="{B35E71E4-6124-034D-B2B1-03D434D48E1D}" type="datetimeFigureOut">
               <a:rPr lang="en-US" smtClean="0"/>
-              <a:t>3/8/21</a:t>
+              <a:t>3/9/21</a:t>
             </a:fld>
             <a:endParaRPr lang="en-US"/>
           </a:p>
@@ -2427,7 +2511,7 @@
           <a:p>
             <a:fld id="{B35E71E4-6124-034D-B2B1-03D434D48E1D}" type="datetimeFigureOut">
               <a:rPr lang="en-US" smtClean="0"/>
-              <a:t>3/8/21</a:t>
+              <a:t>3/9/21</a:t>
             </a:fld>
             <a:endParaRPr lang="en-US"/>
           </a:p>
@@ -2738,7 +2822,7 @@
           <a:p>
             <a:fld id="{B35E71E4-6124-034D-B2B1-03D434D48E1D}" type="datetimeFigureOut">
               <a:rPr lang="en-US" smtClean="0"/>
-              <a:t>3/8/21</a:t>
+              <a:t>3/9/21</a:t>
             </a:fld>
             <a:endParaRPr lang="en-US"/>
           </a:p>
@@ -3026,7 +3110,7 @@
           <a:p>
             <a:fld id="{B35E71E4-6124-034D-B2B1-03D434D48E1D}" type="datetimeFigureOut">
               <a:rPr lang="en-US" smtClean="0"/>
-              <a:t>3/8/21</a:t>
+              <a:t>3/9/21</a:t>
             </a:fld>
             <a:endParaRPr lang="en-US"/>
           </a:p>
@@ -3267,7 +3351,7 @@
           <a:p>
             <a:fld id="{B35E71E4-6124-034D-B2B1-03D434D48E1D}" type="datetimeFigureOut">
               <a:rPr lang="en-US" smtClean="0"/>
-              <a:t>3/8/21</a:t>
+              <a:t>3/9/21</a:t>
             </a:fld>
             <a:endParaRPr lang="en-US"/>
           </a:p>
@@ -5474,10 +5558,10 @@
       </p:pic>
       <p:pic>
         <p:nvPicPr>
-          <p:cNvPr id="5" name="Content Placeholder 4">
-            <a:extLst>
-              <a:ext uri="{FF2B5EF4-FFF2-40B4-BE49-F238E27FC236}">
-                <a16:creationId xmlns:a16="http://schemas.microsoft.com/office/drawing/2014/main" id="{08794858-EB4B-0243-AD12-22FB435CB682}"/>
+          <p:cNvPr id="7" name="Content Placeholder 6" descr="Diagram&#10;&#10;Description automatically generated">
+            <a:extLst>
+              <a:ext uri="{FF2B5EF4-FFF2-40B4-BE49-F238E27FC236}">
+                <a16:creationId xmlns:a16="http://schemas.microsoft.com/office/drawing/2014/main" id="{BDAD0563-6505-6A4F-9998-9631196CA1D8}"/>
               </a:ext>
             </a:extLst>
           </p:cNvPr>
@@ -5490,17 +5574,15 @@
         </p:nvPicPr>
         <p:blipFill>
           <a:blip r:embed="rId3"/>
-          <a:srcRect/>
-          <a:stretch/>
+          <a:stretch>
+            <a:fillRect/>
+          </a:stretch>
         </p:blipFill>
         <p:spPr>
           <a:xfrm>
-            <a:off x="2375488" y="193636"/>
-            <a:ext cx="7554326" cy="3729350"/>
+            <a:off x="3093570" y="314664"/>
+            <a:ext cx="6004860" cy="3569818"/>
           </a:xfrm>
-          <a:prstGeom prst="rect">
-            <a:avLst/>
-          </a:prstGeom>
         </p:spPr>
       </p:pic>
     </p:spTree>
@@ -6401,35 +6483,6 @@
           </a:p>
         </p:txBody>
       </p:sp>
-      <p:pic>
-        <p:nvPicPr>
-          <p:cNvPr id="12" name="Content Placeholder 4">
-            <a:extLst>
-              <a:ext uri="{FF2B5EF4-FFF2-40B4-BE49-F238E27FC236}">
-                <a16:creationId xmlns:a16="http://schemas.microsoft.com/office/drawing/2014/main" id="{771A774C-B1A9-6149-BCF4-983B357155F3}"/>
-              </a:ext>
-            </a:extLst>
-          </p:cNvPr>
-          <p:cNvPicPr>
-            <a:picLocks noChangeAspect="1"/>
-          </p:cNvPicPr>
-          <p:nvPr/>
-        </p:nvPicPr>
-        <p:blipFill rotWithShape="1">
-          <a:blip r:embed="rId3"/>
-          <a:srcRect l="213" t="-70380" r="-7501" b="-25710"/>
-          <a:stretch/>
-        </p:blipFill>
-        <p:spPr>
-          <a:xfrm>
-            <a:off x="1763882" y="-1200150"/>
-            <a:ext cx="3765381" cy="3406662"/>
-          </a:xfrm>
-          <a:prstGeom prst="ellipse">
-            <a:avLst/>
-          </a:prstGeom>
-        </p:spPr>
-      </p:pic>
       <p:sp>
         <p:nvSpPr>
           <p:cNvPr id="86" name="Freeform 68">
@@ -6602,12 +6655,331 @@
           </a:p>
         </p:txBody>
       </p:sp>
+      <p:sp>
+        <p:nvSpPr>
+          <p:cNvPr id="44" name="Content Placeholder 43">
+            <a:extLst>
+              <a:ext uri="{FF2B5EF4-FFF2-40B4-BE49-F238E27FC236}">
+                <a16:creationId xmlns:a16="http://schemas.microsoft.com/office/drawing/2014/main" id="{613FC142-D6B7-4A71-AA1E-CECE9DFBDAF2}"/>
+              </a:ext>
+            </a:extLst>
+          </p:cNvPr>
+          <p:cNvSpPr>
+            <a:spLocks noGrp="1"/>
+          </p:cNvSpPr>
+          <p:nvPr>
+            <p:ph idx="1"/>
+          </p:nvPr>
+        </p:nvSpPr>
+        <p:spPr>
+          <a:xfrm>
+            <a:off x="6090574" y="2421682"/>
+            <a:ext cx="4977578" cy="3639289"/>
+          </a:xfrm>
+        </p:spPr>
+        <p:txBody>
+          <a:bodyPr anchor="ctr">
+            <a:normAutofit/>
+          </a:bodyPr>
+          <a:lstStyle/>
+          <a:p>
+            <a:pPr marL="0" indent="0">
+              <a:buNone/>
+            </a:pPr>
+            <a:r>
+              <a:rPr lang="en-US" sz="1600" dirty="0">
+                <a:solidFill>
+                  <a:srgbClr val="000000"/>
+                </a:solidFill>
+              </a:rPr>
+              <a:t>The tidy dataset does not meet 2NF criteria. The </a:t>
+            </a:r>
+            <a:r>
+              <a:rPr lang="en-US" sz="1600" dirty="0" err="1">
+                <a:solidFill>
+                  <a:srgbClr val="000000"/>
+                </a:solidFill>
+              </a:rPr>
+              <a:t>nonkey</a:t>
+            </a:r>
+            <a:r>
+              <a:rPr lang="en-US" sz="1600" dirty="0">
+                <a:solidFill>
+                  <a:srgbClr val="000000"/>
+                </a:solidFill>
+              </a:rPr>
+              <a:t> element </a:t>
+            </a:r>
+            <a:r>
+              <a:rPr lang="en-US" sz="1600" b="1" dirty="0">
+                <a:solidFill>
+                  <a:srgbClr val="000000"/>
+                </a:solidFill>
+              </a:rPr>
+              <a:t>feature</a:t>
+            </a:r>
+            <a:r>
+              <a:rPr lang="en-US" sz="1600" dirty="0">
+                <a:solidFill>
+                  <a:srgbClr val="000000"/>
+                </a:solidFill>
+              </a:rPr>
+              <a:t> is not functionally dependent on the table ID: </a:t>
+            </a:r>
+            <a:r>
+              <a:rPr lang="en-US" sz="1600" b="1" dirty="0">
+                <a:solidFill>
+                  <a:srgbClr val="000000"/>
+                </a:solidFill>
+              </a:rPr>
+              <a:t>season</a:t>
+            </a:r>
+            <a:r>
+              <a:rPr lang="en-US" sz="1600" dirty="0">
+                <a:solidFill>
+                  <a:srgbClr val="000000"/>
+                </a:solidFill>
+              </a:rPr>
+              <a:t> and </a:t>
+            </a:r>
+            <a:r>
+              <a:rPr lang="en-US" sz="1600" b="1" dirty="0">
+                <a:solidFill>
+                  <a:srgbClr val="000000"/>
+                </a:solidFill>
+              </a:rPr>
+              <a:t>episode</a:t>
+            </a:r>
+            <a:r>
+              <a:rPr lang="en-US" sz="1600" dirty="0">
+                <a:solidFill>
+                  <a:srgbClr val="000000"/>
+                </a:solidFill>
+              </a:rPr>
+              <a:t>. There are numerous features that could be associated with each key.</a:t>
+            </a:r>
+          </a:p>
+          <a:p>
+            <a:pPr marL="0" indent="0">
+              <a:buNone/>
+            </a:pPr>
+            <a:r>
+              <a:rPr lang="en-US" sz="1600" dirty="0">
+                <a:solidFill>
+                  <a:srgbClr val="000000"/>
+                </a:solidFill>
+              </a:rPr>
+              <a:t>To meet 2NF criteria, I moved the features to their own table. Because of the many-to-many relationship between episodes and features, I created the link table </a:t>
+            </a:r>
+            <a:r>
+              <a:rPr lang="en-US" sz="1600" i="1" dirty="0" err="1">
+                <a:solidFill>
+                  <a:srgbClr val="000000"/>
+                </a:solidFill>
+              </a:rPr>
+              <a:t>features_in_paintings</a:t>
+            </a:r>
+            <a:r>
+              <a:rPr lang="en-US" sz="1600" i="1" dirty="0">
+                <a:solidFill>
+                  <a:srgbClr val="000000"/>
+                </a:solidFill>
+              </a:rPr>
+              <a:t> </a:t>
+            </a:r>
+            <a:r>
+              <a:rPr lang="en-US" sz="1600" dirty="0">
+                <a:solidFill>
+                  <a:srgbClr val="000000"/>
+                </a:solidFill>
+              </a:rPr>
+              <a:t>to connect </a:t>
+            </a:r>
+            <a:r>
+              <a:rPr lang="en-US" sz="1600" i="1" dirty="0">
+                <a:solidFill>
+                  <a:srgbClr val="000000"/>
+                </a:solidFill>
+              </a:rPr>
+              <a:t>episodes</a:t>
+            </a:r>
+            <a:r>
+              <a:rPr lang="en-US" sz="1600" dirty="0">
+                <a:solidFill>
+                  <a:srgbClr val="000000"/>
+                </a:solidFill>
+              </a:rPr>
+              <a:t> to </a:t>
+            </a:r>
+            <a:r>
+              <a:rPr lang="en-US" sz="1600" i="1" dirty="0">
+                <a:solidFill>
+                  <a:srgbClr val="000000"/>
+                </a:solidFill>
+              </a:rPr>
+              <a:t>features</a:t>
+            </a:r>
+            <a:r>
+              <a:rPr lang="en-US" sz="1600" dirty="0">
+                <a:solidFill>
+                  <a:srgbClr val="000000"/>
+                </a:solidFill>
+              </a:rPr>
+              <a:t>. The data now meet 2NF criteria…</a:t>
+            </a:r>
+          </a:p>
+          <a:p>
+            <a:r>
+              <a:rPr lang="en-US" sz="1600" dirty="0">
+                <a:solidFill>
+                  <a:srgbClr val="000000"/>
+                </a:solidFill>
+              </a:rPr>
+              <a:t>The data still meet 1NF criteria</a:t>
+            </a:r>
+          </a:p>
+          <a:p>
+            <a:r>
+              <a:rPr lang="en-US" sz="1600" dirty="0">
+                <a:solidFill>
+                  <a:srgbClr val="000000"/>
+                </a:solidFill>
+              </a:rPr>
+              <a:t>The composite key, </a:t>
+            </a:r>
+            <a:r>
+              <a:rPr lang="en-US" sz="1600" b="1" dirty="0" err="1">
+                <a:solidFill>
+                  <a:srgbClr val="000000"/>
+                </a:solidFill>
+              </a:rPr>
+              <a:t>season_id</a:t>
+            </a:r>
+            <a:r>
+              <a:rPr lang="en-US" sz="1600" dirty="0">
+                <a:solidFill>
+                  <a:srgbClr val="000000"/>
+                </a:solidFill>
+              </a:rPr>
+              <a:t> and </a:t>
+            </a:r>
+            <a:r>
+              <a:rPr lang="en-US" sz="1600" b="1" dirty="0" err="1">
+                <a:solidFill>
+                  <a:srgbClr val="000000"/>
+                </a:solidFill>
+              </a:rPr>
+              <a:t>episode_id</a:t>
+            </a:r>
+            <a:r>
+              <a:rPr lang="en-US" sz="1600" dirty="0">
+                <a:solidFill>
+                  <a:srgbClr val="000000"/>
+                </a:solidFill>
+              </a:rPr>
+              <a:t>, determine the </a:t>
+            </a:r>
+            <a:r>
+              <a:rPr lang="en-US" sz="1600" b="1" dirty="0">
+                <a:solidFill>
+                  <a:srgbClr val="000000"/>
+                </a:solidFill>
+              </a:rPr>
+              <a:t>title</a:t>
+            </a:r>
+            <a:r>
+              <a:rPr lang="en-US" sz="1600" dirty="0">
+                <a:solidFill>
+                  <a:srgbClr val="000000"/>
+                </a:solidFill>
+              </a:rPr>
+              <a:t>, </a:t>
+            </a:r>
+            <a:r>
+              <a:rPr lang="en-US" sz="1600" b="1" dirty="0" err="1">
+                <a:solidFill>
+                  <a:srgbClr val="000000"/>
+                </a:solidFill>
+              </a:rPr>
+              <a:t>artist_name</a:t>
+            </a:r>
+            <a:r>
+              <a:rPr lang="en-US" sz="1600" dirty="0">
+                <a:solidFill>
+                  <a:srgbClr val="000000"/>
+                </a:solidFill>
+              </a:rPr>
+              <a:t>, and </a:t>
+            </a:r>
+            <a:r>
+              <a:rPr lang="en-US" sz="1600" b="1" dirty="0" err="1">
+                <a:solidFill>
+                  <a:srgbClr val="000000"/>
+                </a:solidFill>
+              </a:rPr>
+              <a:t>artist_relationship</a:t>
+            </a:r>
+            <a:r>
+              <a:rPr lang="en-US" sz="1600" b="1" dirty="0">
+                <a:solidFill>
+                  <a:srgbClr val="000000"/>
+                </a:solidFill>
+              </a:rPr>
+              <a:t> </a:t>
+            </a:r>
+            <a:r>
+              <a:rPr lang="en-US" sz="1600" dirty="0">
+                <a:solidFill>
+                  <a:srgbClr val="000000"/>
+                </a:solidFill>
+              </a:rPr>
+              <a:t>(there is only one value for each key).</a:t>
+            </a:r>
+          </a:p>
+          <a:p>
+            <a:endParaRPr lang="en-US" sz="1600" dirty="0">
+              <a:solidFill>
+                <a:srgbClr val="000000"/>
+              </a:solidFill>
+            </a:endParaRPr>
+          </a:p>
+        </p:txBody>
+      </p:sp>
       <p:pic>
         <p:nvPicPr>
-          <p:cNvPr id="4" name="Picture 3" descr="Application&#10;&#10;Description automatically generated with low confidence">
-            <a:extLst>
-              <a:ext uri="{FF2B5EF4-FFF2-40B4-BE49-F238E27FC236}">
-                <a16:creationId xmlns:a16="http://schemas.microsoft.com/office/drawing/2014/main" id="{77D598B0-7F75-0D4D-AA0D-9FECFFF8F30F}"/>
+          <p:cNvPr id="10" name="Content Placeholder 6" descr="Diagram&#10;&#10;Description automatically generated">
+            <a:extLst>
+              <a:ext uri="{FF2B5EF4-FFF2-40B4-BE49-F238E27FC236}">
+                <a16:creationId xmlns:a16="http://schemas.microsoft.com/office/drawing/2014/main" id="{3C74B32E-E55D-F248-AFBA-E3F53EFA073B}"/>
+              </a:ext>
+            </a:extLst>
+          </p:cNvPr>
+          <p:cNvPicPr>
+            <a:picLocks noChangeAspect="1"/>
+          </p:cNvPicPr>
+          <p:nvPr/>
+        </p:nvPicPr>
+        <p:blipFill rotWithShape="1">
+          <a:blip r:embed="rId3"/>
+          <a:srcRect l="10571" t="-8257" r="-6300" b="-52452"/>
+          <a:stretch/>
+        </p:blipFill>
+        <p:spPr>
+          <a:xfrm>
+            <a:off x="-485775" y="2912701"/>
+            <a:ext cx="5452500" cy="5441759"/>
+          </a:xfrm>
+          <a:prstGeom prst="ellipse">
+            <a:avLst/>
+          </a:prstGeom>
+        </p:spPr>
+      </p:pic>
+      <p:pic>
+        <p:nvPicPr>
+          <p:cNvPr id="7" name="Picture 6" descr="Table&#10;&#10;Description automatically generated">
+            <a:extLst>
+              <a:ext uri="{FF2B5EF4-FFF2-40B4-BE49-F238E27FC236}">
+                <a16:creationId xmlns:a16="http://schemas.microsoft.com/office/drawing/2014/main" id="{7BA2ED89-F87C-6842-84CF-BEEF812C7558}"/>
               </a:ext>
             </a:extLst>
           </p:cNvPr>
@@ -6618,309 +6990,19 @@
         </p:nvPicPr>
         <p:blipFill rotWithShape="1">
           <a:blip r:embed="rId4"/>
-          <a:srcRect b="49800"/>
+          <a:srcRect l="-47322" t="-62880" r="-47322" b="18983"/>
           <a:stretch/>
         </p:blipFill>
         <p:spPr>
           <a:xfrm>
-            <a:off x="985838" y="3329055"/>
-            <a:ext cx="2584349" cy="3459581"/>
+            <a:off x="1763882" y="-1667435"/>
+            <a:ext cx="3880988" cy="3856018"/>
           </a:xfrm>
-          <a:prstGeom prst="rect">
+          <a:prstGeom prst="ellipse">
             <a:avLst/>
           </a:prstGeom>
         </p:spPr>
       </p:pic>
-      <p:sp>
-        <p:nvSpPr>
-          <p:cNvPr id="44" name="Content Placeholder 43">
-            <a:extLst>
-              <a:ext uri="{FF2B5EF4-FFF2-40B4-BE49-F238E27FC236}">
-                <a16:creationId xmlns:a16="http://schemas.microsoft.com/office/drawing/2014/main" id="{613FC142-D6B7-4A71-AA1E-CECE9DFBDAF2}"/>
-              </a:ext>
-            </a:extLst>
-          </p:cNvPr>
-          <p:cNvSpPr>
-            <a:spLocks noGrp="1"/>
-          </p:cNvSpPr>
-          <p:nvPr>
-            <p:ph idx="1"/>
-          </p:nvPr>
-        </p:nvSpPr>
-        <p:spPr>
-          <a:xfrm>
-            <a:off x="6090574" y="2421682"/>
-            <a:ext cx="4977578" cy="3639289"/>
-          </a:xfrm>
-        </p:spPr>
-        <p:txBody>
-          <a:bodyPr anchor="ctr">
-            <a:normAutofit/>
-          </a:bodyPr>
-          <a:lstStyle/>
-          <a:p>
-            <a:pPr marL="0" indent="0">
-              <a:buNone/>
-            </a:pPr>
-            <a:r>
-              <a:rPr lang="en-US" sz="1600" dirty="0">
-                <a:solidFill>
-                  <a:srgbClr val="000000"/>
-                </a:solidFill>
-              </a:rPr>
-              <a:t>The tidy dataset does not meet 2NF criteria. The </a:t>
-            </a:r>
-            <a:r>
-              <a:rPr lang="en-US" sz="1600" dirty="0" err="1">
-                <a:solidFill>
-                  <a:srgbClr val="000000"/>
-                </a:solidFill>
-              </a:rPr>
-              <a:t>nonkey</a:t>
-            </a:r>
-            <a:r>
-              <a:rPr lang="en-US" sz="1600" dirty="0">
-                <a:solidFill>
-                  <a:srgbClr val="000000"/>
-                </a:solidFill>
-              </a:rPr>
-              <a:t> element </a:t>
-            </a:r>
-            <a:r>
-              <a:rPr lang="en-US" sz="1600" b="1" dirty="0">
-                <a:solidFill>
-                  <a:srgbClr val="000000"/>
-                </a:solidFill>
-              </a:rPr>
-              <a:t>feature</a:t>
-            </a:r>
-            <a:r>
-              <a:rPr lang="en-US" sz="1600" dirty="0">
-                <a:solidFill>
-                  <a:srgbClr val="000000"/>
-                </a:solidFill>
-              </a:rPr>
-              <a:t> is not functionally dependent on the table ID: </a:t>
-            </a:r>
-            <a:r>
-              <a:rPr lang="en-US" sz="1600" b="1" dirty="0">
-                <a:solidFill>
-                  <a:srgbClr val="000000"/>
-                </a:solidFill>
-              </a:rPr>
-              <a:t>season</a:t>
-            </a:r>
-            <a:r>
-              <a:rPr lang="en-US" sz="1600" dirty="0">
-                <a:solidFill>
-                  <a:srgbClr val="000000"/>
-                </a:solidFill>
-              </a:rPr>
-              <a:t> and </a:t>
-            </a:r>
-            <a:r>
-              <a:rPr lang="en-US" sz="1600" b="1" dirty="0">
-                <a:solidFill>
-                  <a:srgbClr val="000000"/>
-                </a:solidFill>
-              </a:rPr>
-              <a:t>episode</a:t>
-            </a:r>
-            <a:r>
-              <a:rPr lang="en-US" sz="1600" dirty="0">
-                <a:solidFill>
-                  <a:srgbClr val="000000"/>
-                </a:solidFill>
-              </a:rPr>
-              <a:t>. There are numerous features that could be associated with each key.</a:t>
-            </a:r>
-          </a:p>
-          <a:p>
-            <a:pPr marL="0" indent="0">
-              <a:buNone/>
-            </a:pPr>
-            <a:r>
-              <a:rPr lang="en-US" sz="1600" dirty="0">
-                <a:solidFill>
-                  <a:srgbClr val="000000"/>
-                </a:solidFill>
-              </a:rPr>
-              <a:t>To meet 2NF criteria, I moved the features column to their own table. Because of the many-to-many relationship between episodes and features, I created the link table </a:t>
-            </a:r>
-            <a:r>
-              <a:rPr lang="en-US" sz="1600" i="1" dirty="0" err="1">
-                <a:solidFill>
-                  <a:srgbClr val="000000"/>
-                </a:solidFill>
-              </a:rPr>
-              <a:t>features_in_paintings</a:t>
-            </a:r>
-            <a:r>
-              <a:rPr lang="en-US" sz="1600" i="1" dirty="0">
-                <a:solidFill>
-                  <a:srgbClr val="000000"/>
-                </a:solidFill>
-              </a:rPr>
-              <a:t> </a:t>
-            </a:r>
-            <a:r>
-              <a:rPr lang="en-US" sz="1600" dirty="0">
-                <a:solidFill>
-                  <a:srgbClr val="000000"/>
-                </a:solidFill>
-              </a:rPr>
-              <a:t>to connect </a:t>
-            </a:r>
-            <a:r>
-              <a:rPr lang="en-US" sz="1600" i="1" dirty="0">
-                <a:solidFill>
-                  <a:srgbClr val="000000"/>
-                </a:solidFill>
-              </a:rPr>
-              <a:t>episodes</a:t>
-            </a:r>
-            <a:r>
-              <a:rPr lang="en-US" sz="1600" dirty="0">
-                <a:solidFill>
-                  <a:srgbClr val="000000"/>
-                </a:solidFill>
-              </a:rPr>
-              <a:t> to </a:t>
-            </a:r>
-            <a:r>
-              <a:rPr lang="en-US" sz="1600" i="1" dirty="0">
-                <a:solidFill>
-                  <a:srgbClr val="000000"/>
-                </a:solidFill>
-              </a:rPr>
-              <a:t>features</a:t>
-            </a:r>
-            <a:r>
-              <a:rPr lang="en-US" sz="1600" dirty="0">
-                <a:solidFill>
-                  <a:srgbClr val="000000"/>
-                </a:solidFill>
-              </a:rPr>
-              <a:t>. The data now meet 2NF criteria…</a:t>
-            </a:r>
-          </a:p>
-          <a:p>
-            <a:r>
-              <a:rPr lang="en-US" sz="1600" dirty="0">
-                <a:solidFill>
-                  <a:srgbClr val="000000"/>
-                </a:solidFill>
-              </a:rPr>
-              <a:t>The data still meet 1NF criteria</a:t>
-            </a:r>
-          </a:p>
-          <a:p>
-            <a:r>
-              <a:rPr lang="en-US" sz="1600" dirty="0">
-                <a:solidFill>
-                  <a:srgbClr val="000000"/>
-                </a:solidFill>
-              </a:rPr>
-              <a:t>The composite key, </a:t>
-            </a:r>
-            <a:r>
-              <a:rPr lang="en-US" sz="1600" b="1" dirty="0" err="1">
-                <a:solidFill>
-                  <a:srgbClr val="000000"/>
-                </a:solidFill>
-              </a:rPr>
-              <a:t>season_id</a:t>
-            </a:r>
-            <a:r>
-              <a:rPr lang="en-US" sz="1600" dirty="0">
-                <a:solidFill>
-                  <a:srgbClr val="000000"/>
-                </a:solidFill>
-              </a:rPr>
-              <a:t> and </a:t>
-            </a:r>
-            <a:r>
-              <a:rPr lang="en-US" sz="1600" b="1" dirty="0" err="1">
-                <a:solidFill>
-                  <a:srgbClr val="000000"/>
-                </a:solidFill>
-              </a:rPr>
-              <a:t>episode_id</a:t>
-            </a:r>
-            <a:r>
-              <a:rPr lang="en-US" sz="1600" dirty="0">
-                <a:solidFill>
-                  <a:srgbClr val="000000"/>
-                </a:solidFill>
-              </a:rPr>
-              <a:t>, determine the </a:t>
-            </a:r>
-            <a:r>
-              <a:rPr lang="en-US" sz="1600" b="1" dirty="0">
-                <a:solidFill>
-                  <a:srgbClr val="000000"/>
-                </a:solidFill>
-              </a:rPr>
-              <a:t>title</a:t>
-            </a:r>
-            <a:r>
-              <a:rPr lang="en-US" sz="1600" dirty="0">
-                <a:solidFill>
-                  <a:srgbClr val="000000"/>
-                </a:solidFill>
-              </a:rPr>
-              <a:t>, </a:t>
-            </a:r>
-            <a:r>
-              <a:rPr lang="en-US" sz="1600" b="1" dirty="0" err="1">
-                <a:solidFill>
-                  <a:srgbClr val="000000"/>
-                </a:solidFill>
-              </a:rPr>
-              <a:t>artist_name</a:t>
-            </a:r>
-            <a:r>
-              <a:rPr lang="en-US" sz="1600" dirty="0">
-                <a:solidFill>
-                  <a:srgbClr val="000000"/>
-                </a:solidFill>
-              </a:rPr>
-              <a:t>, and </a:t>
-            </a:r>
-            <a:r>
-              <a:rPr lang="en-US" sz="1600" b="1" dirty="0" err="1">
-                <a:solidFill>
-                  <a:srgbClr val="000000"/>
-                </a:solidFill>
-              </a:rPr>
-              <a:t>artist_relationship</a:t>
-            </a:r>
-            <a:r>
-              <a:rPr lang="en-US" sz="1600" b="1" dirty="0">
-                <a:solidFill>
-                  <a:srgbClr val="000000"/>
-                </a:solidFill>
-              </a:rPr>
-              <a:t> </a:t>
-            </a:r>
-            <a:r>
-              <a:rPr lang="en-US" sz="1600" dirty="0">
-                <a:solidFill>
-                  <a:srgbClr val="000000"/>
-                </a:solidFill>
-              </a:rPr>
-              <a:t>(there is only one value for each key).</a:t>
-            </a:r>
-          </a:p>
-          <a:p>
-            <a:endParaRPr lang="en-US" sz="1600" dirty="0">
-              <a:solidFill>
-                <a:srgbClr val="000000"/>
-              </a:solidFill>
-            </a:endParaRPr>
-          </a:p>
-        </p:txBody>
-      </p:sp>
     </p:spTree>
     <p:extLst>
       <p:ext uri="{BB962C8B-B14F-4D97-AF65-F5344CB8AC3E}">
@@ -6961,10 +7043,10 @@
       </p:grpSpPr>
       <p:sp>
         <p:nvSpPr>
-          <p:cNvPr id="122" name="Rectangle 121">
-            <a:extLst>
-              <a:ext uri="{FF2B5EF4-FFF2-40B4-BE49-F238E27FC236}">
-                <a16:creationId xmlns:a16="http://schemas.microsoft.com/office/drawing/2014/main" id="{B05E4F47-B148-49E0-B472-BBF149315524}"/>
+          <p:cNvPr id="131" name="Rectangle 130">
+            <a:extLst>
+              <a:ext uri="{FF2B5EF4-FFF2-40B4-BE49-F238E27FC236}">
+                <a16:creationId xmlns:a16="http://schemas.microsoft.com/office/drawing/2014/main" id="{0F6CDC51-8D27-4BF4-AB33-7D5905E80D90}"/>
               </a:ext>
               <a:ext uri="{C183D7F6-B498-43B3-948B-1728B52AA6E4}">
                 <adec:decorative xmlns:adec="http://schemas.microsoft.com/office/drawing/2017/decorative" val="1"/>
@@ -6984,8 +7066,8 @@
         </p:nvSpPr>
         <p:spPr>
           <a:xfrm>
-            <a:off x="5769972" y="0"/>
-            <a:ext cx="6421721" cy="6858000"/>
+            <a:off x="5708905" y="3726"/>
+            <a:ext cx="6483095" cy="6858000"/>
           </a:xfrm>
           <a:prstGeom prst="rect">
             <a:avLst/>
@@ -7047,10 +7129,10 @@
       </p:sp>
       <p:pic>
         <p:nvPicPr>
-          <p:cNvPr id="124" name="Picture 123">
-            <a:extLst>
-              <a:ext uri="{FF2B5EF4-FFF2-40B4-BE49-F238E27FC236}">
-                <a16:creationId xmlns:a16="http://schemas.microsoft.com/office/drawing/2014/main" id="{7A2CE8EB-F719-4F84-9E91-F538438CAC76}"/>
+          <p:cNvPr id="133" name="Picture 132">
+            <a:extLst>
+              <a:ext uri="{FF2B5EF4-FFF2-40B4-BE49-F238E27FC236}">
+                <a16:creationId xmlns:a16="http://schemas.microsoft.com/office/drawing/2014/main" id="{24FB90F3-DFB9-42D4-B851-120249962A25}"/>
               </a:ext>
               <a:ext uri="{C183D7F6-B498-43B3-948B-1728B52AA6E4}">
                 <adec:decorative xmlns:adec="http://schemas.microsoft.com/office/drawing/2017/decorative" val="1"/>
@@ -7069,7 +7151,7 @@
           </p:nvPr>
         </p:nvPicPr>
         <p:blipFill>
-          <a:blip r:embed="rId2">
+          <a:blip r:embed="rId3">
             <a:extLst>
               <a:ext uri="{28A0092B-C50C-407E-A947-70E740481C1C}">
                 <a14:useLocalDpi xmlns:a14="http://schemas.microsoft.com/office/drawing/2010/main" val="0"/>
@@ -7108,8 +7190,8 @@
         </p:nvSpPr>
         <p:spPr>
           <a:xfrm>
-            <a:off x="801340" y="802955"/>
-            <a:ext cx="4766330" cy="1454051"/>
+            <a:off x="804672" y="802955"/>
+            <a:ext cx="5145024" cy="1454051"/>
           </a:xfrm>
         </p:spPr>
         <p:txBody>
@@ -7119,7 +7201,7 @@
           <a:lstStyle/>
           <a:p>
             <a:r>
-              <a:rPr lang="en-US" sz="3600">
+              <a:rPr lang="en-US" sz="4000">
                 <a:solidFill>
                   <a:srgbClr val="000000"/>
                 </a:solidFill>
@@ -7127,7 +7209,7 @@
               <a:t>Third</a:t>
             </a:r>
             <a:r>
-              <a:rPr lang="en-US" sz="3600" kern="1200">
+              <a:rPr lang="en-US" sz="4000" kern="1200">
                 <a:solidFill>
                   <a:srgbClr val="000000"/>
                 </a:solidFill>
@@ -7142,298 +7224,10 @@
       </p:sp>
       <p:sp>
         <p:nvSpPr>
-          <p:cNvPr id="44" name="Content Placeholder 43">
-            <a:extLst>
-              <a:ext uri="{FF2B5EF4-FFF2-40B4-BE49-F238E27FC236}">
-                <a16:creationId xmlns:a16="http://schemas.microsoft.com/office/drawing/2014/main" id="{613FC142-D6B7-4A71-AA1E-CECE9DFBDAF2}"/>
-              </a:ext>
-            </a:extLst>
-          </p:cNvPr>
-          <p:cNvSpPr>
-            <a:spLocks noGrp="1"/>
-          </p:cNvSpPr>
-          <p:nvPr>
-            <p:ph idx="1"/>
-          </p:nvPr>
-        </p:nvSpPr>
-        <p:spPr>
-          <a:xfrm>
-            <a:off x="804672" y="2421683"/>
-            <a:ext cx="4765949" cy="3353476"/>
-          </a:xfrm>
-        </p:spPr>
-        <p:txBody>
-          <a:bodyPr anchor="t">
-            <a:normAutofit/>
-          </a:bodyPr>
-          <a:lstStyle/>
-          <a:p>
-            <a:pPr marL="0" indent="0">
-              <a:buNone/>
-            </a:pPr>
-            <a:r>
-              <a:rPr lang="en-US" sz="1400" dirty="0">
-                <a:solidFill>
-                  <a:srgbClr val="000000"/>
-                </a:solidFill>
-              </a:rPr>
-              <a:t>The episodes data, even without the features, does not yet meet 3NF criteria. The </a:t>
-            </a:r>
-            <a:r>
-              <a:rPr lang="en-US" sz="1400" b="1" dirty="0" err="1">
-                <a:solidFill>
-                  <a:srgbClr val="000000"/>
-                </a:solidFill>
-              </a:rPr>
-              <a:t>artist_relationship</a:t>
-            </a:r>
-            <a:r>
-              <a:rPr lang="en-US" sz="1400" b="1" dirty="0">
-                <a:solidFill>
-                  <a:srgbClr val="000000"/>
-                </a:solidFill>
-              </a:rPr>
-              <a:t> </a:t>
-            </a:r>
-            <a:r>
-              <a:rPr lang="en-US" sz="1400" dirty="0">
-                <a:solidFill>
-                  <a:srgbClr val="000000"/>
-                </a:solidFill>
-              </a:rPr>
-              <a:t>depends on the </a:t>
-            </a:r>
-            <a:r>
-              <a:rPr lang="en-US" sz="1400" b="1" dirty="0" err="1">
-                <a:solidFill>
-                  <a:srgbClr val="000000"/>
-                </a:solidFill>
-              </a:rPr>
-              <a:t>artist_name</a:t>
-            </a:r>
-            <a:r>
-              <a:rPr lang="en-US" sz="1400" b="1" dirty="0">
-                <a:solidFill>
-                  <a:srgbClr val="000000"/>
-                </a:solidFill>
-              </a:rPr>
-              <a:t> </a:t>
-            </a:r>
-            <a:r>
-              <a:rPr lang="en-US" sz="1400" dirty="0">
-                <a:solidFill>
-                  <a:srgbClr val="000000"/>
-                </a:solidFill>
-              </a:rPr>
-              <a:t>but is not a candidate key.</a:t>
-            </a:r>
-          </a:p>
-          <a:p>
-            <a:pPr marL="0" indent="0">
-              <a:buNone/>
-            </a:pPr>
-            <a:r>
-              <a:rPr lang="en-US" sz="1400" dirty="0">
-                <a:solidFill>
-                  <a:srgbClr val="000000"/>
-                </a:solidFill>
-              </a:rPr>
-              <a:t>To meet 3NF criteria, I moved </a:t>
-            </a:r>
-            <a:r>
-              <a:rPr lang="en-US" sz="1400" b="1" dirty="0" err="1">
-                <a:solidFill>
-                  <a:srgbClr val="000000"/>
-                </a:solidFill>
-              </a:rPr>
-              <a:t>artist_name</a:t>
-            </a:r>
-            <a:r>
-              <a:rPr lang="en-US" sz="1400" b="1" dirty="0">
-                <a:solidFill>
-                  <a:srgbClr val="000000"/>
-                </a:solidFill>
-              </a:rPr>
-              <a:t> </a:t>
-            </a:r>
-            <a:r>
-              <a:rPr lang="en-US" sz="1400" dirty="0">
-                <a:solidFill>
-                  <a:srgbClr val="000000"/>
-                </a:solidFill>
-              </a:rPr>
-              <a:t>(as </a:t>
-            </a:r>
-            <a:r>
-              <a:rPr lang="en-US" sz="1400" b="1" dirty="0" err="1">
-                <a:solidFill>
-                  <a:srgbClr val="000000"/>
-                </a:solidFill>
-              </a:rPr>
-              <a:t>first_name</a:t>
-            </a:r>
-            <a:r>
-              <a:rPr lang="en-US" sz="1400" b="1" dirty="0">
-                <a:solidFill>
-                  <a:srgbClr val="000000"/>
-                </a:solidFill>
-              </a:rPr>
-              <a:t> </a:t>
-            </a:r>
-            <a:r>
-              <a:rPr lang="en-US" sz="1400" dirty="0">
-                <a:solidFill>
-                  <a:srgbClr val="000000"/>
-                </a:solidFill>
-              </a:rPr>
-              <a:t>and</a:t>
-            </a:r>
-            <a:r>
-              <a:rPr lang="en-US" sz="1400" b="1" dirty="0">
-                <a:solidFill>
-                  <a:srgbClr val="000000"/>
-                </a:solidFill>
-              </a:rPr>
-              <a:t> </a:t>
-            </a:r>
-            <a:r>
-              <a:rPr lang="en-US" sz="1400" b="1" dirty="0" err="1">
-                <a:solidFill>
-                  <a:srgbClr val="000000"/>
-                </a:solidFill>
-              </a:rPr>
-              <a:t>last_name</a:t>
-            </a:r>
-            <a:r>
-              <a:rPr lang="en-US" sz="1400" dirty="0">
-                <a:solidFill>
-                  <a:srgbClr val="000000"/>
-                </a:solidFill>
-              </a:rPr>
-              <a:t>) and </a:t>
-            </a:r>
-            <a:r>
-              <a:rPr lang="en-US" sz="1400" b="1" dirty="0" err="1">
-                <a:solidFill>
-                  <a:srgbClr val="000000"/>
-                </a:solidFill>
-              </a:rPr>
-              <a:t>artist_relationship</a:t>
-            </a:r>
-            <a:r>
-              <a:rPr lang="en-US" sz="1400" dirty="0">
-                <a:solidFill>
-                  <a:srgbClr val="000000"/>
-                </a:solidFill>
-              </a:rPr>
-              <a:t> (as </a:t>
-            </a:r>
-            <a:r>
-              <a:rPr lang="en-US" sz="1400" b="1" dirty="0">
-                <a:solidFill>
-                  <a:srgbClr val="000000"/>
-                </a:solidFill>
-              </a:rPr>
-              <a:t>relationship</a:t>
-            </a:r>
-            <a:r>
-              <a:rPr lang="en-US" sz="1400" dirty="0">
-                <a:solidFill>
-                  <a:srgbClr val="000000"/>
-                </a:solidFill>
-              </a:rPr>
-              <a:t>) to their own table, </a:t>
-            </a:r>
-            <a:r>
-              <a:rPr lang="en-US" sz="1400" i="1" dirty="0">
-                <a:solidFill>
-                  <a:srgbClr val="000000"/>
-                </a:solidFill>
-              </a:rPr>
-              <a:t>artists</a:t>
-            </a:r>
-            <a:r>
-              <a:rPr lang="en-US" sz="1400" dirty="0">
-                <a:solidFill>
-                  <a:srgbClr val="000000"/>
-                </a:solidFill>
-              </a:rPr>
-              <a:t>. Because there is a one-to-many relationship between artists and episodes, I made a connection directly from the new </a:t>
-            </a:r>
-            <a:r>
-              <a:rPr lang="en-US" sz="1400" i="1" dirty="0">
-                <a:solidFill>
-                  <a:srgbClr val="000000"/>
-                </a:solidFill>
-              </a:rPr>
-              <a:t>artists</a:t>
-            </a:r>
-            <a:r>
-              <a:rPr lang="en-US" sz="1400" dirty="0">
-                <a:solidFill>
-                  <a:srgbClr val="000000"/>
-                </a:solidFill>
-              </a:rPr>
-              <a:t> table to the </a:t>
-            </a:r>
-            <a:r>
-              <a:rPr lang="en-US" sz="1400" i="1" dirty="0">
-                <a:solidFill>
-                  <a:srgbClr val="000000"/>
-                </a:solidFill>
-              </a:rPr>
-              <a:t>episodes</a:t>
-            </a:r>
-            <a:r>
-              <a:rPr lang="en-US" sz="1400" dirty="0">
-                <a:solidFill>
-                  <a:srgbClr val="000000"/>
-                </a:solidFill>
-              </a:rPr>
-              <a:t> table.</a:t>
-            </a:r>
-          </a:p>
-          <a:p>
-            <a:pPr marL="0" indent="0">
-              <a:buNone/>
-            </a:pPr>
-            <a:r>
-              <a:rPr lang="en-US" sz="1400" dirty="0">
-                <a:solidFill>
-                  <a:srgbClr val="000000"/>
-                </a:solidFill>
-              </a:rPr>
-              <a:t>The data now meet 3NF criteria because…</a:t>
-            </a:r>
-          </a:p>
-          <a:p>
-            <a:r>
-              <a:rPr lang="en-US" sz="1400" dirty="0">
-                <a:solidFill>
-                  <a:srgbClr val="000000"/>
-                </a:solidFill>
-              </a:rPr>
-              <a:t>The data still meets 2NF criteria</a:t>
-            </a:r>
-          </a:p>
-          <a:p>
-            <a:r>
-              <a:rPr lang="en-US" sz="1400" dirty="0">
-                <a:solidFill>
-                  <a:srgbClr val="000000"/>
-                </a:solidFill>
-              </a:rPr>
-              <a:t>There are no transitive dependencies - there are no columns in any table that depend on anything other than their primary key(s)</a:t>
-            </a:r>
-          </a:p>
-        </p:txBody>
-      </p:sp>
-      <p:sp>
-        <p:nvSpPr>
-          <p:cNvPr id="126" name="Freeform 50">
-            <a:extLst>
-              <a:ext uri="{FF2B5EF4-FFF2-40B4-BE49-F238E27FC236}">
-                <a16:creationId xmlns:a16="http://schemas.microsoft.com/office/drawing/2014/main" id="{684BF3E1-C321-4F38-85CF-FEBBEEC15E2D}"/>
+          <p:cNvPr id="135" name="Freeform 60">
+            <a:extLst>
+              <a:ext uri="{FF2B5EF4-FFF2-40B4-BE49-F238E27FC236}">
+                <a16:creationId xmlns:a16="http://schemas.microsoft.com/office/drawing/2014/main" id="{DF4CE22F-8463-44F2-BE50-65D9B5035E87}"/>
               </a:ext>
               <a:ext uri="{C183D7F6-B498-43B3-948B-1728B52AA6E4}">
                 <adec:decorative xmlns:adec="http://schemas.microsoft.com/office/drawing/2017/decorative" val="1"/>
@@ -7453,34 +7247,26 @@
         </p:nvSpPr>
         <p:spPr>
           <a:xfrm>
-            <a:off x="6727121" y="581159"/>
-            <a:ext cx="5464879" cy="6276841"/>
+            <a:off x="6588720" y="0"/>
+            <a:ext cx="3762182" cy="2258435"/>
           </a:xfrm>
           <a:custGeom>
             <a:avLst/>
             <a:gdLst>
-              <a:gd name="connsiteX0" fmla="*/ 3299930 w 5464879"/>
-              <a:gd name="connsiteY0" fmla="*/ 0 h 6276841"/>
-              <a:gd name="connsiteX1" fmla="*/ 5398992 w 5464879"/>
-              <a:gd name="connsiteY1" fmla="*/ 753544 h 6276841"/>
-              <a:gd name="connsiteX2" fmla="*/ 5464879 w 5464879"/>
-              <a:gd name="connsiteY2" fmla="*/ 813426 h 6276841"/>
-              <a:gd name="connsiteX3" fmla="*/ 5464879 w 5464879"/>
-              <a:gd name="connsiteY3" fmla="*/ 5786434 h 6276841"/>
-              <a:gd name="connsiteX4" fmla="*/ 5398992 w 5464879"/>
-              <a:gd name="connsiteY4" fmla="*/ 5846317 h 6276841"/>
-              <a:gd name="connsiteX5" fmla="*/ 4872873 w 5464879"/>
-              <a:gd name="connsiteY5" fmla="*/ 6201577 h 6276841"/>
-              <a:gd name="connsiteX6" fmla="*/ 4716632 w 5464879"/>
-              <a:gd name="connsiteY6" fmla="*/ 6276841 h 6276841"/>
-              <a:gd name="connsiteX7" fmla="*/ 1883227 w 5464879"/>
-              <a:gd name="connsiteY7" fmla="*/ 6276841 h 6276841"/>
-              <a:gd name="connsiteX8" fmla="*/ 1726987 w 5464879"/>
-              <a:gd name="connsiteY8" fmla="*/ 6201577 h 6276841"/>
-              <a:gd name="connsiteX9" fmla="*/ 0 w 5464879"/>
-              <a:gd name="connsiteY9" fmla="*/ 3299930 h 6276841"/>
-              <a:gd name="connsiteX10" fmla="*/ 3299930 w 5464879"/>
-              <a:gd name="connsiteY10" fmla="*/ 0 h 6276841"/>
+              <a:gd name="connsiteX0" fmla="*/ 39946 w 3960192"/>
+              <a:gd name="connsiteY0" fmla="*/ 0 h 2377300"/>
+              <a:gd name="connsiteX1" fmla="*/ 3920247 w 3960192"/>
+              <a:gd name="connsiteY1" fmla="*/ 0 h 2377300"/>
+              <a:gd name="connsiteX2" fmla="*/ 3949969 w 3960192"/>
+              <a:gd name="connsiteY2" fmla="*/ 194751 h 2377300"/>
+              <a:gd name="connsiteX3" fmla="*/ 3960192 w 3960192"/>
+              <a:gd name="connsiteY3" fmla="*/ 397204 h 2377300"/>
+              <a:gd name="connsiteX4" fmla="*/ 1980096 w 3960192"/>
+              <a:gd name="connsiteY4" fmla="*/ 2377300 h 2377300"/>
+              <a:gd name="connsiteX5" fmla="*/ 0 w 3960192"/>
+              <a:gd name="connsiteY5" fmla="*/ 397204 h 2377300"/>
+              <a:gd name="connsiteX6" fmla="*/ 10224 w 3960192"/>
+              <a:gd name="connsiteY6" fmla="*/ 194751 h 2377300"/>
             </a:gdLst>
             <a:ahLst/>
             <a:cxnLst>
@@ -7505,62 +7291,38 @@
               <a:cxn ang="0">
                 <a:pos x="connsiteX6" y="connsiteY6"/>
               </a:cxn>
-              <a:cxn ang="0">
-                <a:pos x="connsiteX7" y="connsiteY7"/>
-              </a:cxn>
-              <a:cxn ang="0">
-                <a:pos x="connsiteX8" y="connsiteY8"/>
-              </a:cxn>
-              <a:cxn ang="0">
-                <a:pos x="connsiteX9" y="connsiteY9"/>
-              </a:cxn>
-              <a:cxn ang="0">
-                <a:pos x="connsiteX10" y="connsiteY10"/>
-              </a:cxn>
             </a:cxnLst>
             <a:rect l="l" t="t" r="r" b="b"/>
             <a:pathLst>
-              <a:path w="5464879" h="6276841">
+              <a:path w="3960192" h="2377300">
                 <a:moveTo>
-                  <a:pt x="3299930" y="0"/>
+                  <a:pt x="39946" y="0"/>
                 </a:moveTo>
-                <a:cubicBezTo>
-                  <a:pt x="4097274" y="0"/>
-                  <a:pt x="4828569" y="282789"/>
-                  <a:pt x="5398992" y="753544"/>
-                </a:cubicBezTo>
                 <a:lnTo>
-                  <a:pt x="5464879" y="813426"/>
+                  <a:pt x="3920247" y="0"/>
                 </a:lnTo>
                 <a:lnTo>
-                  <a:pt x="5464879" y="5786434"/>
-                </a:lnTo>
-                <a:lnTo>
-                  <a:pt x="5398992" y="5846317"/>
+                  <a:pt x="3949969" y="194751"/>
                 </a:lnTo>
                 <a:cubicBezTo>
-                  <a:pt x="5236014" y="5980818"/>
-                  <a:pt x="5059904" y="6099975"/>
-                  <a:pt x="4872873" y="6201577"/>
-                </a:cubicBezTo>
-                <a:lnTo>
-                  <a:pt x="4716632" y="6276841"/>
-                </a:lnTo>
-                <a:lnTo>
-                  <a:pt x="1883227" y="6276841"/>
-                </a:lnTo>
-                <a:lnTo>
-                  <a:pt x="1726987" y="6201577"/>
-                </a:lnTo>
-                <a:cubicBezTo>
-                  <a:pt x="698316" y="5642769"/>
-                  <a:pt x="0" y="4552900"/>
-                  <a:pt x="0" y="3299930"/>
+                  <a:pt x="3956729" y="261316"/>
+                  <a:pt x="3960192" y="328856"/>
+                  <a:pt x="3960192" y="397204"/>
                 </a:cubicBezTo>
                 <a:cubicBezTo>
-                  <a:pt x="0" y="1477429"/>
-                  <a:pt x="1477429" y="0"/>
-                  <a:pt x="3299930" y="0"/>
+                  <a:pt x="3960192" y="1490781"/>
+                  <a:pt x="3073673" y="2377300"/>
+                  <a:pt x="1980096" y="2377300"/>
+                </a:cubicBezTo>
+                <a:cubicBezTo>
+                  <a:pt x="886519" y="2377300"/>
+                  <a:pt x="0" y="1490781"/>
+                  <a:pt x="0" y="397204"/>
+                </a:cubicBezTo>
+                <a:cubicBezTo>
+                  <a:pt x="0" y="328856"/>
+                  <a:pt x="3463" y="261316"/>
+                  <a:pt x="10224" y="194751"/>
                 </a:cubicBezTo>
                 <a:close/>
               </a:path>
@@ -7628,10 +7390,428 @@
       </p:sp>
       <p:pic>
         <p:nvPicPr>
-          <p:cNvPr id="7" name="Content Placeholder 4">
-            <a:extLst>
-              <a:ext uri="{FF2B5EF4-FFF2-40B4-BE49-F238E27FC236}">
-                <a16:creationId xmlns:a16="http://schemas.microsoft.com/office/drawing/2014/main" id="{883EA5F9-145B-CF4A-B9A1-776BA779F81F}"/>
+          <p:cNvPr id="4" name="Picture 3" descr="Table&#10;&#10;Description automatically generated">
+            <a:extLst>
+              <a:ext uri="{FF2B5EF4-FFF2-40B4-BE49-F238E27FC236}">
+                <a16:creationId xmlns:a16="http://schemas.microsoft.com/office/drawing/2014/main" id="{80EB27A0-CC14-2146-84F5-8D2D990F111C}"/>
+              </a:ext>
+            </a:extLst>
+          </p:cNvPr>
+          <p:cNvPicPr>
+            <a:picLocks noChangeAspect="1"/>
+          </p:cNvPicPr>
+          <p:nvPr/>
+        </p:nvPicPr>
+        <p:blipFill>
+          <a:blip r:embed="rId4"/>
+          <a:stretch>
+            <a:fillRect/>
+          </a:stretch>
+        </p:blipFill>
+        <p:spPr>
+          <a:xfrm>
+            <a:off x="6980648" y="111300"/>
+            <a:ext cx="2978325" cy="1348083"/>
+          </a:xfrm>
+          <a:prstGeom prst="rect">
+            <a:avLst/>
+          </a:prstGeom>
+        </p:spPr>
+      </p:pic>
+      <p:sp>
+        <p:nvSpPr>
+          <p:cNvPr id="44" name="Content Placeholder 43">
+            <a:extLst>
+              <a:ext uri="{FF2B5EF4-FFF2-40B4-BE49-F238E27FC236}">
+                <a16:creationId xmlns:a16="http://schemas.microsoft.com/office/drawing/2014/main" id="{613FC142-D6B7-4A71-AA1E-CECE9DFBDAF2}"/>
+              </a:ext>
+            </a:extLst>
+          </p:cNvPr>
+          <p:cNvSpPr>
+            <a:spLocks noGrp="1"/>
+          </p:cNvSpPr>
+          <p:nvPr>
+            <p:ph idx="1"/>
+          </p:nvPr>
+        </p:nvSpPr>
+        <p:spPr>
+          <a:xfrm>
+            <a:off x="804672" y="2421682"/>
+            <a:ext cx="5145024" cy="3639289"/>
+          </a:xfrm>
+        </p:spPr>
+        <p:txBody>
+          <a:bodyPr anchor="ctr">
+            <a:normAutofit/>
+          </a:bodyPr>
+          <a:lstStyle/>
+          <a:p>
+            <a:pPr marL="0" indent="0">
+              <a:buNone/>
+            </a:pPr>
+            <a:r>
+              <a:rPr lang="en-US" sz="1700">
+                <a:solidFill>
+                  <a:srgbClr val="000000"/>
+                </a:solidFill>
+              </a:rPr>
+              <a:t>The episodes data, even without the features, does not yet meet 3NF criteria. The </a:t>
+            </a:r>
+            <a:r>
+              <a:rPr lang="en-US" sz="1700" b="1">
+                <a:solidFill>
+                  <a:srgbClr val="000000"/>
+                </a:solidFill>
+              </a:rPr>
+              <a:t>artist_relationship </a:t>
+            </a:r>
+            <a:r>
+              <a:rPr lang="en-US" sz="1700">
+                <a:solidFill>
+                  <a:srgbClr val="000000"/>
+                </a:solidFill>
+              </a:rPr>
+              <a:t>depends on the </a:t>
+            </a:r>
+            <a:r>
+              <a:rPr lang="en-US" sz="1700" b="1">
+                <a:solidFill>
+                  <a:srgbClr val="000000"/>
+                </a:solidFill>
+              </a:rPr>
+              <a:t>artist_name </a:t>
+            </a:r>
+            <a:r>
+              <a:rPr lang="en-US" sz="1700">
+                <a:solidFill>
+                  <a:srgbClr val="000000"/>
+                </a:solidFill>
+              </a:rPr>
+              <a:t>but is not a candidate key.</a:t>
+            </a:r>
+          </a:p>
+          <a:p>
+            <a:pPr marL="0" indent="0">
+              <a:buNone/>
+            </a:pPr>
+            <a:r>
+              <a:rPr lang="en-US" sz="1700">
+                <a:solidFill>
+                  <a:srgbClr val="000000"/>
+                </a:solidFill>
+              </a:rPr>
+              <a:t>To meet 3NF criteria, I moved </a:t>
+            </a:r>
+            <a:r>
+              <a:rPr lang="en-US" sz="1700" b="1">
+                <a:solidFill>
+                  <a:srgbClr val="000000"/>
+                </a:solidFill>
+              </a:rPr>
+              <a:t>artist_name </a:t>
+            </a:r>
+            <a:r>
+              <a:rPr lang="en-US" sz="1700">
+                <a:solidFill>
+                  <a:srgbClr val="000000"/>
+                </a:solidFill>
+              </a:rPr>
+              <a:t>and </a:t>
+            </a:r>
+            <a:r>
+              <a:rPr lang="en-US" sz="1700" b="1">
+                <a:solidFill>
+                  <a:srgbClr val="000000"/>
+                </a:solidFill>
+              </a:rPr>
+              <a:t>artist_relationship</a:t>
+            </a:r>
+            <a:r>
+              <a:rPr lang="en-US" sz="1700">
+                <a:solidFill>
+                  <a:srgbClr val="000000"/>
+                </a:solidFill>
+              </a:rPr>
+              <a:t> (as </a:t>
+            </a:r>
+            <a:r>
+              <a:rPr lang="en-US" sz="1700" b="1">
+                <a:solidFill>
+                  <a:srgbClr val="000000"/>
+                </a:solidFill>
+              </a:rPr>
+              <a:t>relationship</a:t>
+            </a:r>
+            <a:r>
+              <a:rPr lang="en-US" sz="1700">
+                <a:solidFill>
+                  <a:srgbClr val="000000"/>
+                </a:solidFill>
+              </a:rPr>
+              <a:t>) to their own table, </a:t>
+            </a:r>
+            <a:r>
+              <a:rPr lang="en-US" sz="1700" i="1">
+                <a:solidFill>
+                  <a:srgbClr val="000000"/>
+                </a:solidFill>
+              </a:rPr>
+              <a:t>artists</a:t>
+            </a:r>
+            <a:r>
+              <a:rPr lang="en-US" sz="1700">
+                <a:solidFill>
+                  <a:srgbClr val="000000"/>
+                </a:solidFill>
+              </a:rPr>
+              <a:t>. Because there is a one-to-many relationship between artists and episodes, I made a connection directly from the new </a:t>
+            </a:r>
+            <a:r>
+              <a:rPr lang="en-US" sz="1700" i="1">
+                <a:solidFill>
+                  <a:srgbClr val="000000"/>
+                </a:solidFill>
+              </a:rPr>
+              <a:t>artists</a:t>
+            </a:r>
+            <a:r>
+              <a:rPr lang="en-US" sz="1700">
+                <a:solidFill>
+                  <a:srgbClr val="000000"/>
+                </a:solidFill>
+              </a:rPr>
+              <a:t> table to the </a:t>
+            </a:r>
+            <a:r>
+              <a:rPr lang="en-US" sz="1700" i="1">
+                <a:solidFill>
+                  <a:srgbClr val="000000"/>
+                </a:solidFill>
+              </a:rPr>
+              <a:t>episodes</a:t>
+            </a:r>
+            <a:r>
+              <a:rPr lang="en-US" sz="1700">
+                <a:solidFill>
+                  <a:srgbClr val="000000"/>
+                </a:solidFill>
+              </a:rPr>
+              <a:t> table.</a:t>
+            </a:r>
+          </a:p>
+          <a:p>
+            <a:pPr marL="0" indent="0">
+              <a:buNone/>
+            </a:pPr>
+            <a:r>
+              <a:rPr lang="en-US" sz="1700">
+                <a:solidFill>
+                  <a:srgbClr val="000000"/>
+                </a:solidFill>
+              </a:rPr>
+              <a:t>The data now meet 3NF criteria because…</a:t>
+            </a:r>
+          </a:p>
+          <a:p>
+            <a:r>
+              <a:rPr lang="en-US" sz="1700">
+                <a:solidFill>
+                  <a:srgbClr val="000000"/>
+                </a:solidFill>
+              </a:rPr>
+              <a:t>The data still meets 2NF criteria</a:t>
+            </a:r>
+          </a:p>
+          <a:p>
+            <a:r>
+              <a:rPr lang="en-US" sz="1700">
+                <a:solidFill>
+                  <a:srgbClr val="000000"/>
+                </a:solidFill>
+              </a:rPr>
+              <a:t>There are no transitive dependencies - there are no columns in any table that depend on anything other than their primary key(s)</a:t>
+            </a:r>
+          </a:p>
+        </p:txBody>
+      </p:sp>
+      <p:sp>
+        <p:nvSpPr>
+          <p:cNvPr id="137" name="Freeform 67">
+            <a:extLst>
+              <a:ext uri="{FF2B5EF4-FFF2-40B4-BE49-F238E27FC236}">
+                <a16:creationId xmlns:a16="http://schemas.microsoft.com/office/drawing/2014/main" id="{3FA1383B-2709-4E36-8FF8-7A737213B4CB}"/>
+              </a:ext>
+              <a:ext uri="{C183D7F6-B498-43B3-948B-1728B52AA6E4}">
+                <adec:decorative xmlns:adec="http://schemas.microsoft.com/office/drawing/2017/decorative" val="1"/>
+              </a:ext>
+            </a:extLst>
+          </p:cNvPr>
+          <p:cNvSpPr>
+            <a:spLocks noGrp="1" noRot="1" noChangeAspect="1" noMove="1" noResize="1" noEditPoints="1" noAdjustHandles="1" noChangeArrowheads="1" noChangeShapeType="1" noTextEdit="1"/>
+          </p:cNvSpPr>
+          <p:nvPr>
+            <p:extLst>
+              <p:ext uri="{386F3935-93C4-4BCD-93E2-E3B085C9AB24}">
+                <p16:designElem xmlns:p16="http://schemas.microsoft.com/office/powerpoint/2015/main" val="1"/>
+              </p:ext>
+            </p:extLst>
+          </p:nvPr>
+        </p:nvSpPr>
+        <p:spPr>
+          <a:xfrm>
+            <a:off x="7457503" y="3006774"/>
+            <a:ext cx="4734497" cy="3851226"/>
+          </a:xfrm>
+          <a:custGeom>
+            <a:avLst/>
+            <a:gdLst>
+              <a:gd name="connsiteX0" fmla="*/ 2718646 w 4647408"/>
+              <a:gd name="connsiteY0" fmla="*/ 0 h 3780384"/>
+              <a:gd name="connsiteX1" fmla="*/ 4641019 w 4647408"/>
+              <a:gd name="connsiteY1" fmla="*/ 796273 h 3780384"/>
+              <a:gd name="connsiteX2" fmla="*/ 4647408 w 4647408"/>
+              <a:gd name="connsiteY2" fmla="*/ 803303 h 3780384"/>
+              <a:gd name="connsiteX3" fmla="*/ 4647408 w 4647408"/>
+              <a:gd name="connsiteY3" fmla="*/ 3780384 h 3780384"/>
+              <a:gd name="connsiteX4" fmla="*/ 215340 w 4647408"/>
+              <a:gd name="connsiteY4" fmla="*/ 3780384 h 3780384"/>
+              <a:gd name="connsiteX5" fmla="*/ 213645 w 4647408"/>
+              <a:gd name="connsiteY5" fmla="*/ 3776866 h 3780384"/>
+              <a:gd name="connsiteX6" fmla="*/ 0 w 4647408"/>
+              <a:gd name="connsiteY6" fmla="*/ 2718646 h 3780384"/>
+              <a:gd name="connsiteX7" fmla="*/ 2718646 w 4647408"/>
+              <a:gd name="connsiteY7" fmla="*/ 0 h 3780384"/>
+            </a:gdLst>
+            <a:ahLst/>
+            <a:cxnLst>
+              <a:cxn ang="0">
+                <a:pos x="connsiteX0" y="connsiteY0"/>
+              </a:cxn>
+              <a:cxn ang="0">
+                <a:pos x="connsiteX1" y="connsiteY1"/>
+              </a:cxn>
+              <a:cxn ang="0">
+                <a:pos x="connsiteX2" y="connsiteY2"/>
+              </a:cxn>
+              <a:cxn ang="0">
+                <a:pos x="connsiteX3" y="connsiteY3"/>
+              </a:cxn>
+              <a:cxn ang="0">
+                <a:pos x="connsiteX4" y="connsiteY4"/>
+              </a:cxn>
+              <a:cxn ang="0">
+                <a:pos x="connsiteX5" y="connsiteY5"/>
+              </a:cxn>
+              <a:cxn ang="0">
+                <a:pos x="connsiteX6" y="connsiteY6"/>
+              </a:cxn>
+              <a:cxn ang="0">
+                <a:pos x="connsiteX7" y="connsiteY7"/>
+              </a:cxn>
+            </a:cxnLst>
+            <a:rect l="l" t="t" r="r" b="b"/>
+            <a:pathLst>
+              <a:path w="4647408" h="3780384">
+                <a:moveTo>
+                  <a:pt x="2718646" y="0"/>
+                </a:moveTo>
+                <a:cubicBezTo>
+                  <a:pt x="3469379" y="0"/>
+                  <a:pt x="4149041" y="304295"/>
+                  <a:pt x="4641019" y="796273"/>
+                </a:cubicBezTo>
+                <a:lnTo>
+                  <a:pt x="4647408" y="803303"/>
+                </a:lnTo>
+                <a:lnTo>
+                  <a:pt x="4647408" y="3780384"/>
+                </a:lnTo>
+                <a:lnTo>
+                  <a:pt x="215340" y="3780384"/>
+                </a:lnTo>
+                <a:lnTo>
+                  <a:pt x="213645" y="3776866"/>
+                </a:lnTo>
+                <a:cubicBezTo>
+                  <a:pt x="76074" y="3451612"/>
+                  <a:pt x="0" y="3094013"/>
+                  <a:pt x="0" y="2718646"/>
+                </a:cubicBezTo>
+                <a:cubicBezTo>
+                  <a:pt x="0" y="1217179"/>
+                  <a:pt x="1217179" y="0"/>
+                  <a:pt x="2718646" y="0"/>
+                </a:cubicBezTo>
+                <a:close/>
+              </a:path>
+            </a:pathLst>
+          </a:custGeom>
+          <a:solidFill>
+            <a:srgbClr val="FFFFFF"/>
+          </a:solidFill>
+          <a:ln>
+            <a:gradFill>
+              <a:gsLst>
+                <a:gs pos="0">
+                  <a:schemeClr val="accent1">
+                    <a:lumMod val="40000"/>
+                    <a:lumOff val="60000"/>
+                  </a:schemeClr>
+                </a:gs>
+                <a:gs pos="23000">
+                  <a:schemeClr val="accent1">
+                    <a:lumMod val="45000"/>
+                    <a:lumOff val="55000"/>
+                  </a:schemeClr>
+                </a:gs>
+                <a:gs pos="83000">
+                  <a:schemeClr val="bg2">
+                    <a:lumMod val="75000"/>
+                  </a:schemeClr>
+                </a:gs>
+                <a:gs pos="100000">
+                  <a:schemeClr val="bg2">
+                    <a:lumMod val="75000"/>
+                  </a:schemeClr>
+                </a:gs>
+              </a:gsLst>
+              <a:lin ang="5400000" scaled="1"/>
+            </a:gradFill>
+          </a:ln>
+        </p:spPr>
+        <p:style>
+          <a:lnRef idx="2">
+            <a:schemeClr val="accent1">
+              <a:shade val="50000"/>
+            </a:schemeClr>
+          </a:lnRef>
+          <a:fillRef idx="1">
+            <a:schemeClr val="accent1"/>
+          </a:fillRef>
+          <a:effectRef idx="0">
+            <a:schemeClr val="accent1"/>
+          </a:effectRef>
+          <a:fontRef idx="minor">
+            <a:schemeClr val="lt1"/>
+          </a:fontRef>
+        </p:style>
+        <p:txBody>
+          <a:bodyPr wrap="square" rtlCol="0" anchor="ctr">
+            <a:noAutofit/>
+          </a:bodyPr>
+          <a:lstStyle/>
+          <a:p>
+            <a:pPr algn="ctr"/>
+            <a:endParaRPr lang="en-US"/>
+          </a:p>
+        </p:txBody>
+      </p:sp>
+      <p:pic>
+        <p:nvPicPr>
+          <p:cNvPr id="8" name="Content Placeholder 6" descr="Diagram&#10;&#10;Description automatically generated">
+            <a:extLst>
+              <a:ext uri="{FF2B5EF4-FFF2-40B4-BE49-F238E27FC236}">
+                <a16:creationId xmlns:a16="http://schemas.microsoft.com/office/drawing/2014/main" id="{89FCF527-C8B5-B045-BCFD-83F7AA8A0302}"/>
               </a:ext>
             </a:extLst>
           </p:cNvPr>
@@ -7641,14 +7821,14 @@
           <p:nvPr/>
         </p:nvPicPr>
         <p:blipFill rotWithShape="1">
-          <a:blip r:embed="rId3"/>
-          <a:srcRect l="-4417" t="-67326" r="-20663" b="-87101"/>
+          <a:blip r:embed="rId5"/>
+          <a:srcRect l="-14749" t="-30904" r="-21901" b="-98886"/>
           <a:stretch/>
         </p:blipFill>
         <p:spPr>
           <a:xfrm>
-            <a:off x="6726816" y="581159"/>
-            <a:ext cx="6546272" cy="6591166"/>
+            <a:off x="7457502" y="3031623"/>
+            <a:ext cx="5539169" cy="5526589"/>
           </a:xfrm>
           <a:prstGeom prst="ellipse">
             <a:avLst/>

</xml_diff>

<commit_message>
Update Joy of Painting
</commit_message>
<xml_diff>
--- a/Ross Joy of Painting/hw04_Over_Lisa_ross_db_model.pptx
+++ b/Ross Joy of Painting/hw04_Over_Lisa_ross_db_model.pptx
@@ -203,7 +203,7 @@
           <a:p>
             <a:fld id="{6831E22B-9873-A448-AE08-4DDD3B823C68}" type="datetimeFigureOut">
               <a:rPr lang="en-US" smtClean="0"/>
-              <a:t>3/10/21</a:t>
+              <a:t>4/1/21</a:t>
             </a:fld>
             <a:endParaRPr lang="en-US"/>
           </a:p>
@@ -701,7 +701,7 @@
           <a:p>
             <a:fld id="{B35E71E4-6124-034D-B2B1-03D434D48E1D}" type="datetimeFigureOut">
               <a:rPr lang="en-US" smtClean="0"/>
-              <a:t>3/10/21</a:t>
+              <a:t>4/1/21</a:t>
             </a:fld>
             <a:endParaRPr lang="en-US"/>
           </a:p>
@@ -899,7 +899,7 @@
           <a:p>
             <a:fld id="{B35E71E4-6124-034D-B2B1-03D434D48E1D}" type="datetimeFigureOut">
               <a:rPr lang="en-US" smtClean="0"/>
-              <a:t>3/10/21</a:t>
+              <a:t>4/1/21</a:t>
             </a:fld>
             <a:endParaRPr lang="en-US"/>
           </a:p>
@@ -1107,7 +1107,7 @@
           <a:p>
             <a:fld id="{B35E71E4-6124-034D-B2B1-03D434D48E1D}" type="datetimeFigureOut">
               <a:rPr lang="en-US" smtClean="0"/>
-              <a:t>3/10/21</a:t>
+              <a:t>4/1/21</a:t>
             </a:fld>
             <a:endParaRPr lang="en-US"/>
           </a:p>
@@ -1305,7 +1305,7 @@
           <a:p>
             <a:fld id="{B35E71E4-6124-034D-B2B1-03D434D48E1D}" type="datetimeFigureOut">
               <a:rPr lang="en-US" smtClean="0"/>
-              <a:t>3/10/21</a:t>
+              <a:t>4/1/21</a:t>
             </a:fld>
             <a:endParaRPr lang="en-US"/>
           </a:p>
@@ -1580,7 +1580,7 @@
           <a:p>
             <a:fld id="{B35E71E4-6124-034D-B2B1-03D434D48E1D}" type="datetimeFigureOut">
               <a:rPr lang="en-US" smtClean="0"/>
-              <a:t>3/10/21</a:t>
+              <a:t>4/1/21</a:t>
             </a:fld>
             <a:endParaRPr lang="en-US"/>
           </a:p>
@@ -1845,7 +1845,7 @@
           <a:p>
             <a:fld id="{B35E71E4-6124-034D-B2B1-03D434D48E1D}" type="datetimeFigureOut">
               <a:rPr lang="en-US" smtClean="0"/>
-              <a:t>3/10/21</a:t>
+              <a:t>4/1/21</a:t>
             </a:fld>
             <a:endParaRPr lang="en-US"/>
           </a:p>
@@ -2257,7 +2257,7 @@
           <a:p>
             <a:fld id="{B35E71E4-6124-034D-B2B1-03D434D48E1D}" type="datetimeFigureOut">
               <a:rPr lang="en-US" smtClean="0"/>
-              <a:t>3/10/21</a:t>
+              <a:t>4/1/21</a:t>
             </a:fld>
             <a:endParaRPr lang="en-US"/>
           </a:p>
@@ -2398,7 +2398,7 @@
           <a:p>
             <a:fld id="{B35E71E4-6124-034D-B2B1-03D434D48E1D}" type="datetimeFigureOut">
               <a:rPr lang="en-US" smtClean="0"/>
-              <a:t>3/10/21</a:t>
+              <a:t>4/1/21</a:t>
             </a:fld>
             <a:endParaRPr lang="en-US"/>
           </a:p>
@@ -2511,7 +2511,7 @@
           <a:p>
             <a:fld id="{B35E71E4-6124-034D-B2B1-03D434D48E1D}" type="datetimeFigureOut">
               <a:rPr lang="en-US" smtClean="0"/>
-              <a:t>3/10/21</a:t>
+              <a:t>4/1/21</a:t>
             </a:fld>
             <a:endParaRPr lang="en-US"/>
           </a:p>
@@ -2822,7 +2822,7 @@
           <a:p>
             <a:fld id="{B35E71E4-6124-034D-B2B1-03D434D48E1D}" type="datetimeFigureOut">
               <a:rPr lang="en-US" smtClean="0"/>
-              <a:t>3/10/21</a:t>
+              <a:t>4/1/21</a:t>
             </a:fld>
             <a:endParaRPr lang="en-US"/>
           </a:p>
@@ -3110,7 +3110,7 @@
           <a:p>
             <a:fld id="{B35E71E4-6124-034D-B2B1-03D434D48E1D}" type="datetimeFigureOut">
               <a:rPr lang="en-US" smtClean="0"/>
-              <a:t>3/10/21</a:t>
+              <a:t>4/1/21</a:t>
             </a:fld>
             <a:endParaRPr lang="en-US"/>
           </a:p>
@@ -3351,7 +3351,7 @@
           <a:p>
             <a:fld id="{B35E71E4-6124-034D-B2B1-03D434D48E1D}" type="datetimeFigureOut">
               <a:rPr lang="en-US" smtClean="0"/>
-              <a:t>3/10/21</a:t>
+              <a:t>4/1/21</a:t>
             </a:fld>
             <a:endParaRPr lang="en-US"/>
           </a:p>
@@ -5820,7 +5820,7 @@
         </p:spPr>
         <p:txBody>
           <a:bodyPr anchor="t">
-            <a:normAutofit lnSpcReduction="10000"/>
+            <a:normAutofit fontScale="92500" lnSpcReduction="10000"/>
           </a:bodyPr>
           <a:lstStyle/>
           <a:p>
@@ -5833,7 +5833,23 @@
                   <a:srgbClr val="000000"/>
                 </a:solidFill>
               </a:rPr>
-              <a:t>Tidy data meet 1NF criteria…</a:t>
+              <a:t>The Bob Ross Joy </a:t>
+            </a:r>
+            <a:r>
+              <a:rPr lang="en-US" sz="1800">
+                <a:solidFill>
+                  <a:srgbClr val="000000"/>
+                </a:solidFill>
+              </a:rPr>
+              <a:t>of Painting data </a:t>
+            </a:r>
+            <a:r>
+              <a:rPr lang="en-US" sz="1800" dirty="0">
+                <a:solidFill>
+                  <a:srgbClr val="000000"/>
+                </a:solidFill>
+              </a:rPr>
+              <a:t>meet 1NF criteria…</a:t>
             </a:r>
           </a:p>
           <a:p>

</xml_diff>